<commit_message>
Fix bux in user registration
Assign false to isAdmin and don't clear form after submit
</commit_message>
<xml_diff>
--- a/CARTs.pptx
+++ b/CARTs.pptx
@@ -9,6 +9,7 @@
     <p:sldId id="257" r:id="rId3"/>
     <p:sldId id="258" r:id="rId4"/>
     <p:sldId id="259" r:id="rId5"/>
+    <p:sldId id="260" r:id="rId6"/>
   </p:sldIdLst>
   <p:sldSz cx="12192000" cy="6858000"/>
   <p:notesSz cx="6858000" cy="9144000"/>
@@ -107,6 +108,11 @@
       </a:defRPr>
     </a:lvl9pPr>
   </p:defaultTextStyle>
+  <p:extLst>
+    <p:ext uri="{EFAFB233-063F-42B5-8137-9DF3F51BA10A}">
+      <p15:sldGuideLst xmlns:p15="http://schemas.microsoft.com/office/powerpoint/2012/main"/>
+    </p:ext>
+  </p:extLst>
 </p:presentation>
 </file>
 
@@ -261,7 +267,7 @@
           <a:p>
             <a:fld id="{23FEA57E-7C1A-457B-A4CD-5DCEB057B502}" type="datetime1">
               <a:rPr lang="en-US" smtClean="0"/>
-              <a:t>11/30/2020</a:t>
+              <a:t>12/7/2020</a:t>
             </a:fld>
             <a:endParaRPr lang="en-US" dirty="0"/>
           </a:p>
@@ -464,7 +470,7 @@
           <a:p>
             <a:fld id="{11789749-A4CD-447F-8298-2B7988C91CEA}" type="datetime1">
               <a:rPr lang="en-US" smtClean="0"/>
-              <a:t>11/30/2020</a:t>
+              <a:t>12/7/2020</a:t>
             </a:fld>
             <a:endParaRPr lang="en-US"/>
           </a:p>
@@ -675,7 +681,7 @@
           <a:p>
             <a:fld id="{BA0444D3-C0BA-4587-A56C-581AB9F841BE}" type="datetime1">
               <a:rPr lang="en-US" smtClean="0"/>
-              <a:t>11/30/2020</a:t>
+              <a:t>12/7/2020</a:t>
             </a:fld>
             <a:endParaRPr lang="en-US"/>
           </a:p>
@@ -889,7 +895,7 @@
           <a:p>
             <a:fld id="{201AF2CE-4F37-411C-A3EE-BBBE223265BF}" type="datetime1">
               <a:rPr lang="en-US" smtClean="0"/>
-              <a:t>11/30/2020</a:t>
+              <a:t>12/7/2020</a:t>
             </a:fld>
             <a:endParaRPr lang="en-US"/>
           </a:p>
@@ -1170,7 +1176,7 @@
           <a:p>
             <a:fld id="{C96083D4-708C-4BB5-B4FD-30CE9FA12FD5}" type="datetime1">
               <a:rPr lang="en-US" smtClean="0"/>
-              <a:t>11/30/2020</a:t>
+              <a:t>12/7/2020</a:t>
             </a:fld>
             <a:endParaRPr lang="en-US"/>
           </a:p>
@@ -1450,7 +1456,7 @@
           <a:p>
             <a:fld id="{D0D239B2-65BC-4C2A-A62B-3EABFE9590E4}" type="datetime1">
               <a:rPr lang="en-US" smtClean="0"/>
-              <a:t>11/30/2020</a:t>
+              <a:t>12/7/2020</a:t>
             </a:fld>
             <a:endParaRPr lang="en-US"/>
           </a:p>
@@ -1872,7 +1878,7 @@
           <a:p>
             <a:fld id="{85E05F5A-E4A3-476F-A89E-C2B73F2431E4}" type="datetime1">
               <a:rPr lang="en-US" smtClean="0"/>
-              <a:t>11/30/2020</a:t>
+              <a:t>12/7/2020</a:t>
             </a:fld>
             <a:endParaRPr lang="en-US"/>
           </a:p>
@@ -2017,7 +2023,7 @@
           <a:p>
             <a:fld id="{E3761515-4A26-4F31-9F61-5A10B1FABBFC}" type="datetime1">
               <a:rPr lang="en-US" smtClean="0"/>
-              <a:t>11/30/2020</a:t>
+              <a:t>12/7/2020</a:t>
             </a:fld>
             <a:endParaRPr lang="en-US"/>
           </a:p>
@@ -2133,7 +2139,7 @@
           <a:p>
             <a:fld id="{4A75DC65-7D1F-4BAB-9695-F7E734143E14}" type="datetime1">
               <a:rPr lang="en-US" smtClean="0"/>
-              <a:t>11/30/2020</a:t>
+              <a:t>12/7/2020</a:t>
             </a:fld>
             <a:endParaRPr lang="en-US"/>
           </a:p>
@@ -2447,7 +2453,7 @@
           <a:p>
             <a:fld id="{7E624077-BD55-4036-8E92-6558FDF3B653}" type="datetime1">
               <a:rPr lang="en-US" smtClean="0"/>
-              <a:t>11/30/2020</a:t>
+              <a:t>12/7/2020</a:t>
             </a:fld>
             <a:endParaRPr lang="en-US"/>
           </a:p>
@@ -2741,7 +2747,7 @@
           <a:p>
             <a:fld id="{804225F2-7107-4609-BCC2-77C63064A5E8}" type="datetime1">
               <a:rPr lang="en-US" smtClean="0"/>
-              <a:t>11/30/2020</a:t>
+              <a:t>12/7/2020</a:t>
             </a:fld>
             <a:endParaRPr lang="en-US"/>
           </a:p>
@@ -2989,7 +2995,7 @@
           <a:p>
             <a:fld id="{D3FE42E8-8B57-452D-A122-4DCE9AC771EF}" type="datetime1">
               <a:rPr lang="en-US" smtClean="0"/>
-              <a:t>11/30/2020</a:t>
+              <a:t>12/7/2020</a:t>
             </a:fld>
             <a:endParaRPr lang="en-US"/>
           </a:p>
@@ -4660,7 +4666,10 @@
           <a:bodyPr/>
           <a:lstStyle/>
           <a:p>
-            <a:endParaRPr lang="de-CH" dirty="0"/>
+            <a:r>
+              <a:rPr lang="de-CH" dirty="0"/>
+              <a:t>a</a:t>
+            </a:r>
           </a:p>
         </p:txBody>
       </p:sp>
@@ -4733,6 +4742,12 @@
               <a:rPr lang="de-CH" dirty="0"/>
               <a:t> backend</a:t>
             </a:r>
+          </a:p>
+          <a:p>
+            <a:pPr marL="0" indent="0">
+              <a:buNone/>
+            </a:pPr>
+            <a:endParaRPr lang="de-CH" dirty="0"/>
           </a:p>
           <a:p>
             <a:pPr marL="0" indent="0">
@@ -4976,6 +4991,204 @@
     <p:extLst>
       <p:ext uri="{BB962C8B-B14F-4D97-AF65-F5344CB8AC3E}">
         <p14:creationId xmlns:p14="http://schemas.microsoft.com/office/powerpoint/2010/main" val="2922563440"/>
+      </p:ext>
+    </p:extLst>
+  </p:cSld>
+  <p:clrMapOvr>
+    <a:masterClrMapping/>
+  </p:clrMapOvr>
+</p:sld>
+</file>
+
+<file path=ppt/slides/slide5.xml><?xml version="1.0" encoding="utf-8"?>
+<p:sld xmlns:a="http://schemas.openxmlformats.org/drawingml/2006/main" xmlns:r="http://schemas.openxmlformats.org/officeDocument/2006/relationships" xmlns:p="http://schemas.openxmlformats.org/presentationml/2006/main">
+  <p:cSld>
+    <p:spTree>
+      <p:nvGrpSpPr>
+        <p:cNvPr id="1" name=""/>
+        <p:cNvGrpSpPr/>
+        <p:nvPr/>
+      </p:nvGrpSpPr>
+      <p:grpSpPr>
+        <a:xfrm>
+          <a:off x="0" y="0"/>
+          <a:ext cx="0" cy="0"/>
+          <a:chOff x="0" y="0"/>
+          <a:chExt cx="0" cy="0"/>
+        </a:xfrm>
+      </p:grpSpPr>
+      <p:sp>
+        <p:nvSpPr>
+          <p:cNvPr id="2" name="Titel 1">
+            <a:extLst>
+              <a:ext uri="{FF2B5EF4-FFF2-40B4-BE49-F238E27FC236}">
+                <a16:creationId xmlns:a16="http://schemas.microsoft.com/office/drawing/2014/main" id="{8B908F78-3771-4B0B-809B-573262386843}"/>
+              </a:ext>
+            </a:extLst>
+          </p:cNvPr>
+          <p:cNvSpPr>
+            <a:spLocks noGrp="1"/>
+          </p:cNvSpPr>
+          <p:nvPr>
+            <p:ph type="title"/>
+          </p:nvPr>
+        </p:nvSpPr>
+        <p:spPr/>
+        <p:txBody>
+          <a:bodyPr/>
+          <a:lstStyle/>
+          <a:p>
+            <a:r>
+              <a:rPr lang="de-CH" dirty="0"/>
+              <a:t>Future </a:t>
+            </a:r>
+            <a:r>
+              <a:rPr lang="de-CH" dirty="0" err="1"/>
+              <a:t>plans</a:t>
+            </a:r>
+            <a:endParaRPr lang="de-CH" dirty="0"/>
+          </a:p>
+        </p:txBody>
+      </p:sp>
+      <p:sp>
+        <p:nvSpPr>
+          <p:cNvPr id="3" name="Inhaltsplatzhalter 2">
+            <a:extLst>
+              <a:ext uri="{FF2B5EF4-FFF2-40B4-BE49-F238E27FC236}">
+                <a16:creationId xmlns:a16="http://schemas.microsoft.com/office/drawing/2014/main" id="{2EEFC444-E26B-42CC-91CE-2C9A0EA96771}"/>
+              </a:ext>
+            </a:extLst>
+          </p:cNvPr>
+          <p:cNvSpPr>
+            <a:spLocks noGrp="1"/>
+          </p:cNvSpPr>
+          <p:nvPr>
+            <p:ph sz="half" idx="1"/>
+          </p:nvPr>
+        </p:nvSpPr>
+        <p:spPr/>
+        <p:txBody>
+          <a:bodyPr/>
+          <a:lstStyle/>
+          <a:p>
+            <a:r>
+              <a:rPr lang="de-CH" dirty="0" err="1"/>
+              <a:t>Forgot</a:t>
+            </a:r>
+            <a:r>
+              <a:rPr lang="de-CH" dirty="0"/>
+              <a:t> </a:t>
+            </a:r>
+            <a:r>
+              <a:rPr lang="de-CH" dirty="0" err="1"/>
+              <a:t>password</a:t>
+            </a:r>
+            <a:endParaRPr lang="de-CH" dirty="0"/>
+          </a:p>
+          <a:p>
+            <a:r>
+              <a:rPr lang="de-CH" dirty="0"/>
+              <a:t>Picture</a:t>
+            </a:r>
+          </a:p>
+          <a:p>
+            <a:r>
+              <a:rPr lang="de-CH" dirty="0"/>
+              <a:t>Ban a </a:t>
+            </a:r>
+            <a:r>
+              <a:rPr lang="de-CH" dirty="0" err="1"/>
+              <a:t>user</a:t>
+            </a:r>
+            <a:endParaRPr lang="de-CH" dirty="0"/>
+          </a:p>
+          <a:p>
+            <a:r>
+              <a:rPr lang="de-CH" dirty="0" err="1"/>
+              <a:t>Promoting</a:t>
+            </a:r>
+            <a:r>
+              <a:rPr lang="de-CH" dirty="0"/>
+              <a:t> </a:t>
+            </a:r>
+            <a:r>
+              <a:rPr lang="de-CH" dirty="0" err="1"/>
+              <a:t>ads</a:t>
+            </a:r>
+            <a:endParaRPr lang="de-CH" dirty="0"/>
+          </a:p>
+          <a:p>
+            <a:r>
+              <a:rPr lang="de-CH" dirty="0" err="1"/>
+              <a:t>Paypal</a:t>
+            </a:r>
+            <a:r>
+              <a:rPr lang="de-CH" dirty="0"/>
+              <a:t> </a:t>
+            </a:r>
+            <a:r>
+              <a:rPr lang="de-CH" dirty="0" err="1"/>
+              <a:t>sandbox</a:t>
+            </a:r>
+            <a:endParaRPr lang="de-CH" dirty="0"/>
+          </a:p>
+          <a:p>
+            <a:r>
+              <a:rPr lang="de-CH" dirty="0"/>
+              <a:t>User </a:t>
+            </a:r>
+            <a:r>
+              <a:rPr lang="de-CH" dirty="0" err="1"/>
+              <a:t>reviews</a:t>
+            </a:r>
+            <a:endParaRPr lang="de-CH" dirty="0"/>
+          </a:p>
+          <a:p>
+            <a:r>
+              <a:rPr lang="de-CH" dirty="0" err="1"/>
+              <a:t>Product</a:t>
+            </a:r>
+            <a:r>
+              <a:rPr lang="de-CH" dirty="0"/>
+              <a:t> </a:t>
+            </a:r>
+            <a:r>
+              <a:rPr lang="de-CH" dirty="0" err="1"/>
+              <a:t>reviews</a:t>
+            </a:r>
+            <a:endParaRPr lang="de-CH" dirty="0"/>
+          </a:p>
+        </p:txBody>
+      </p:sp>
+      <p:sp>
+        <p:nvSpPr>
+          <p:cNvPr id="4" name="Inhaltsplatzhalter 3">
+            <a:extLst>
+              <a:ext uri="{FF2B5EF4-FFF2-40B4-BE49-F238E27FC236}">
+                <a16:creationId xmlns:a16="http://schemas.microsoft.com/office/drawing/2014/main" id="{3181502F-CDA8-4861-9445-34EC3A189AA2}"/>
+              </a:ext>
+            </a:extLst>
+          </p:cNvPr>
+          <p:cNvSpPr>
+            <a:spLocks noGrp="1"/>
+          </p:cNvSpPr>
+          <p:nvPr>
+            <p:ph sz="half" idx="2"/>
+          </p:nvPr>
+        </p:nvSpPr>
+        <p:spPr/>
+        <p:txBody>
+          <a:bodyPr/>
+          <a:lstStyle/>
+          <a:p>
+            <a:endParaRPr lang="de-CH" dirty="0"/>
+          </a:p>
+        </p:txBody>
+      </p:sp>
+    </p:spTree>
+    <p:extLst>
+      <p:ext uri="{BB962C8B-B14F-4D97-AF65-F5344CB8AC3E}">
+        <p14:creationId xmlns:p14="http://schemas.microsoft.com/office/powerpoint/2010/main" val="3494060624"/>
       </p:ext>
     </p:extLst>
   </p:cSld>

</xml_diff>